<commit_message>
add Lec 4 and A4
</commit_message>
<xml_diff>
--- a/Lectures/Lec4/lec4.pptx
+++ b/Lectures/Lec4/lec4.pptx
@@ -224,7 +224,7 @@
           <a:p>
             <a:fld id="{5D1E261F-8C98-8744-8E35-D8BB142E7BA1}" type="datetimeFigureOut">
               <a:rPr lang="en-US" smtClean="0"/>
-              <a:t>2/1/16</a:t>
+              <a:t>1/30/17</a:t>
             </a:fld>
             <a:endParaRPr lang="en-US"/>
           </a:p>
@@ -1470,10 +1470,10 @@
           <a:bodyPr/>
           <a:lstStyle/>
           <a:p>
-            <a:r>
+            <a:fld id="{F7998417-1D6B-9744-8631-E8A5E67CDC55}" type="datetime1">
               <a:rPr lang="en-US" smtClean="0"/>
-              <a:t>02/02/16</a:t>
-            </a:r>
+              <a:t>1/30/17</a:t>
+            </a:fld>
             <a:endParaRPr lang="en-US" dirty="0"/>
           </a:p>
         </p:txBody>
@@ -1684,10 +1684,10 @@
           <a:bodyPr/>
           <a:lstStyle/>
           <a:p>
-            <a:r>
+            <a:fld id="{90EFAFDD-7211-FE45-AAD1-74B128628765}" type="datetime1">
               <a:rPr lang="en-US" smtClean="0"/>
-              <a:t>02/02/16</a:t>
-            </a:r>
+              <a:t>1/30/17</a:t>
+            </a:fld>
             <a:endParaRPr lang="en-US" dirty="0"/>
           </a:p>
         </p:txBody>
@@ -1939,10 +1939,10 @@
           <a:bodyPr/>
           <a:lstStyle/>
           <a:p>
-            <a:r>
+            <a:fld id="{8513E34C-7C42-A84C-96E7-0DE98E6B5DCB}" type="datetime1">
               <a:rPr lang="en-US" smtClean="0"/>
-              <a:t>02/02/16</a:t>
-            </a:r>
+              <a:t>1/30/17</a:t>
+            </a:fld>
             <a:endParaRPr lang="en-US" dirty="0"/>
           </a:p>
         </p:txBody>
@@ -2132,10 +2132,10 @@
           <a:bodyPr/>
           <a:lstStyle/>
           <a:p>
-            <a:r>
+            <a:fld id="{BD7F0350-C236-7847-916E-EB12569D1632}" type="datetime1">
               <a:rPr lang="en-US" smtClean="0"/>
-              <a:t>02/02/16</a:t>
-            </a:r>
+              <a:t>1/30/17</a:t>
+            </a:fld>
             <a:endParaRPr lang="en-US" dirty="0"/>
           </a:p>
         </p:txBody>
@@ -2481,10 +2481,10 @@
           <a:bodyPr/>
           <a:lstStyle/>
           <a:p>
-            <a:r>
+            <a:fld id="{25F0446E-366D-434F-8F62-C37BE746E88A}" type="datetime1">
               <a:rPr lang="en-US" smtClean="0"/>
-              <a:t>02/02/16</a:t>
-            </a:r>
+              <a:t>1/30/17</a:t>
+            </a:fld>
             <a:endParaRPr lang="en-US" dirty="0"/>
           </a:p>
         </p:txBody>
@@ -2755,10 +2755,10 @@
           <a:bodyPr/>
           <a:lstStyle/>
           <a:p>
-            <a:r>
+            <a:fld id="{83AD336B-0755-1641-A03A-19A3721B8115}" type="datetime1">
               <a:rPr lang="en-US" smtClean="0"/>
-              <a:t>02/02/16</a:t>
-            </a:r>
+              <a:t>1/30/17</a:t>
+            </a:fld>
             <a:endParaRPr lang="en-US" dirty="0"/>
           </a:p>
         </p:txBody>
@@ -3133,10 +3133,10 @@
           <a:bodyPr/>
           <a:lstStyle/>
           <a:p>
-            <a:r>
+            <a:fld id="{91514836-9ED2-EE44-8DBC-AE41587A9C9A}" type="datetime1">
               <a:rPr lang="en-US" smtClean="0"/>
-              <a:t>02/02/16</a:t>
-            </a:r>
+              <a:t>1/30/17</a:t>
+            </a:fld>
             <a:endParaRPr lang="en-US" dirty="0"/>
           </a:p>
         </p:txBody>
@@ -3250,10 +3250,10 @@
           <a:bodyPr/>
           <a:lstStyle/>
           <a:p>
-            <a:r>
+            <a:fld id="{B83DBCFB-9BEE-214A-8DB7-FCF277AE045E}" type="datetime1">
               <a:rPr lang="en-US" smtClean="0"/>
-              <a:t>02/02/16</a:t>
-            </a:r>
+              <a:t>1/30/17</a:t>
+            </a:fld>
             <a:endParaRPr lang="en-US" dirty="0"/>
           </a:p>
         </p:txBody>
@@ -3420,10 +3420,10 @@
           <a:bodyPr/>
           <a:lstStyle/>
           <a:p>
-            <a:r>
+            <a:fld id="{D7268FEE-6A75-2646-937E-B62F273A5A83}" type="datetime1">
               <a:rPr lang="en-US" smtClean="0"/>
-              <a:t>02/02/16</a:t>
-            </a:r>
+              <a:t>1/30/17</a:t>
+            </a:fld>
             <a:endParaRPr lang="en-US" dirty="0"/>
           </a:p>
         </p:txBody>
@@ -3774,10 +3774,10 @@
             </a:lvl1pPr>
           </a:lstStyle>
           <a:p>
-            <a:r>
+            <a:fld id="{336DBAE3-4498-DC47-B6FB-40F8C83D1F67}" type="datetime1">
               <a:rPr lang="en-US" smtClean="0"/>
-              <a:t>02/02/16</a:t>
-            </a:r>
+              <a:t>1/30/17</a:t>
+            </a:fld>
             <a:endParaRPr lang="en-US" dirty="0"/>
           </a:p>
         </p:txBody>
@@ -4156,10 +4156,10 @@
           <a:bodyPr/>
           <a:lstStyle/>
           <a:p>
-            <a:r>
+            <a:fld id="{457F435C-4AA6-504A-8635-69B3FED3F3D6}" type="datetime1">
               <a:rPr lang="en-US" smtClean="0"/>
-              <a:t>02/02/16</a:t>
-            </a:r>
+              <a:t>1/30/17</a:t>
+            </a:fld>
             <a:endParaRPr lang="en-US" dirty="0"/>
           </a:p>
         </p:txBody>
@@ -4442,10 +4442,10 @@
             </a:lvl1pPr>
           </a:lstStyle>
           <a:p>
-            <a:r>
+            <a:fld id="{7738F9B6-5D48-414D-BD9E-2265BE981B72}" type="datetime1">
               <a:rPr lang="en-US" smtClean="0"/>
-              <a:t>02/02/16</a:t>
-            </a:r>
+              <a:t>1/30/17</a:t>
+            </a:fld>
             <a:endParaRPr lang="en-US" dirty="0"/>
           </a:p>
         </p:txBody>
@@ -5073,12 +5073,8 @@
               <a:t> </a:t>
             </a:r>
             <a:r>
-              <a:rPr lang="en-US" dirty="0" smtClean="0"/>
-              <a:t>201</a:t>
-            </a:r>
-            <a:r>
               <a:rPr lang="en-US" altLang="zh-CN" dirty="0" smtClean="0"/>
-              <a:t>6</a:t>
+              <a:t>2017</a:t>
             </a:r>
             <a:endParaRPr lang="zh-CN" altLang="en-US" dirty="0"/>
           </a:p>
@@ -5190,10 +5186,10 @@
           <a:bodyPr/>
           <a:lstStyle/>
           <a:p>
-            <a:r>
+            <a:fld id="{78DC2C34-1626-524A-A606-D30862026BFB}" type="datetime1">
               <a:rPr lang="en-US" smtClean="0"/>
-              <a:t>02/02/16</a:t>
-            </a:r>
+              <a:t>1/30/17</a:t>
+            </a:fld>
             <a:endParaRPr lang="en-US" dirty="0"/>
           </a:p>
         </p:txBody>
@@ -5217,29 +5213,6 @@
               <a:rPr lang="en-US" smtClean="0"/>
               <a:t>Jiannan Wang - CMPT 733</a:t>
             </a:r>
-            <a:endParaRPr lang="en-US" dirty="0"/>
-          </a:p>
-        </p:txBody>
-      </p:sp>
-      <p:sp>
-        <p:nvSpPr>
-          <p:cNvPr id="6" name="Slide Number Placeholder 5"/>
-          <p:cNvSpPr>
-            <a:spLocks noGrp="1"/>
-          </p:cNvSpPr>
-          <p:nvPr>
-            <p:ph type="sldNum" sz="quarter" idx="12"/>
-          </p:nvPr>
-        </p:nvSpPr>
-        <p:spPr/>
-        <p:txBody>
-          <a:bodyPr/>
-          <a:lstStyle/>
-          <a:p>
-            <a:fld id="{6113E31D-E2AB-40D1-8B51-AFA5AFEF393A}" type="slidenum">
-              <a:rPr lang="en-US" smtClean="0"/>
-              <a:t>10</a:t>
-            </a:fld>
             <a:endParaRPr lang="en-US" dirty="0"/>
           </a:p>
         </p:txBody>
@@ -6240,6 +6213,29 @@
               <a:rPr lang="en-US" altLang="zh-CN" dirty="0" smtClean="0"/>
               <a:t>Data</a:t>
             </a:r>
+            <a:endParaRPr lang="en-US" dirty="0"/>
+          </a:p>
+        </p:txBody>
+      </p:sp>
+      <p:sp>
+        <p:nvSpPr>
+          <p:cNvPr id="7" name="Slide Number Placeholder 6"/>
+          <p:cNvSpPr>
+            <a:spLocks noGrp="1"/>
+          </p:cNvSpPr>
+          <p:nvPr>
+            <p:ph type="sldNum" sz="quarter" idx="12"/>
+          </p:nvPr>
+        </p:nvSpPr>
+        <p:spPr/>
+        <p:txBody>
+          <a:bodyPr/>
+          <a:lstStyle/>
+          <a:p>
+            <a:fld id="{6113E31D-E2AB-40D1-8B51-AFA5AFEF393A}" type="slidenum">
+              <a:rPr lang="en-US" smtClean="0"/>
+              <a:t>10</a:t>
+            </a:fld>
             <a:endParaRPr lang="en-US" dirty="0"/>
           </a:p>
         </p:txBody>
@@ -7412,10 +7408,10 @@
           <a:bodyPr/>
           <a:lstStyle/>
           <a:p>
-            <a:r>
+            <a:fld id="{0463E698-3D9C-2C41-8CA4-CD7CEBCAFF41}" type="datetime1">
               <a:rPr lang="en-US" smtClean="0"/>
-              <a:t>02/02/16</a:t>
-            </a:r>
+              <a:t>1/30/17</a:t>
+            </a:fld>
             <a:endParaRPr lang="en-US" dirty="0"/>
           </a:p>
         </p:txBody>
@@ -7445,7 +7441,7 @@
       </p:sp>
       <p:sp>
         <p:nvSpPr>
-          <p:cNvPr id="6" name="Slide Number Placeholder 5"/>
+          <p:cNvPr id="7" name="Slide Number Placeholder 6"/>
           <p:cNvSpPr>
             <a:spLocks noGrp="1"/>
           </p:cNvSpPr>
@@ -8093,10 +8089,10 @@
           <a:bodyPr/>
           <a:lstStyle/>
           <a:p>
-            <a:r>
+            <a:fld id="{2DAB0FE8-B0E1-C845-8A3A-B74BB096B828}" type="datetime1">
               <a:rPr lang="en-US" smtClean="0"/>
-              <a:t>02/02/16</a:t>
-            </a:r>
+              <a:t>1/30/17</a:t>
+            </a:fld>
             <a:endParaRPr lang="en-US" dirty="0"/>
           </a:p>
         </p:txBody>
@@ -8126,7 +8122,7 @@
       </p:sp>
       <p:sp>
         <p:nvSpPr>
-          <p:cNvPr id="6" name="Slide Number Placeholder 5"/>
+          <p:cNvPr id="7" name="Slide Number Placeholder 6"/>
           <p:cNvSpPr>
             <a:spLocks noGrp="1"/>
           </p:cNvSpPr>
@@ -8230,10 +8226,10 @@
           <a:bodyPr/>
           <a:lstStyle/>
           <a:p>
-            <a:r>
+            <a:fld id="{231AA8ED-76CF-1D44-AD90-F48F634D2867}" type="datetime1">
               <a:rPr lang="en-US" smtClean="0"/>
-              <a:t>02/02/16</a:t>
-            </a:r>
+              <a:t>1/30/17</a:t>
+            </a:fld>
             <a:endParaRPr lang="en-US" dirty="0"/>
           </a:p>
         </p:txBody>
@@ -8257,29 +8253,6 @@
               <a:rPr lang="en-US" smtClean="0"/>
               <a:t>Jiannan Wang - CMPT 733</a:t>
             </a:r>
-            <a:endParaRPr lang="en-US" dirty="0"/>
-          </a:p>
-        </p:txBody>
-      </p:sp>
-      <p:sp>
-        <p:nvSpPr>
-          <p:cNvPr id="6" name="Slide Number Placeholder 5"/>
-          <p:cNvSpPr>
-            <a:spLocks noGrp="1"/>
-          </p:cNvSpPr>
-          <p:nvPr>
-            <p:ph type="sldNum" sz="quarter" idx="12"/>
-          </p:nvPr>
-        </p:nvSpPr>
-        <p:spPr/>
-        <p:txBody>
-          <a:bodyPr/>
-          <a:lstStyle/>
-          <a:p>
-            <a:fld id="{6113E31D-E2AB-40D1-8B51-AFA5AFEF393A}" type="slidenum">
-              <a:rPr lang="en-US" smtClean="0"/>
-              <a:t>13</a:t>
-            </a:fld>
             <a:endParaRPr lang="en-US" dirty="0"/>
           </a:p>
         </p:txBody>
@@ -8579,6 +8552,29 @@
               <a:latin typeface="Helvetica"/>
               <a:cs typeface="Helvetica"/>
             </a:endParaRPr>
+          </a:p>
+        </p:txBody>
+      </p:sp>
+      <p:sp>
+        <p:nvSpPr>
+          <p:cNvPr id="3" name="Slide Number Placeholder 2"/>
+          <p:cNvSpPr>
+            <a:spLocks noGrp="1"/>
+          </p:cNvSpPr>
+          <p:nvPr>
+            <p:ph type="sldNum" sz="quarter" idx="12"/>
+          </p:nvPr>
+        </p:nvSpPr>
+        <p:spPr/>
+        <p:txBody>
+          <a:bodyPr/>
+          <a:lstStyle/>
+          <a:p>
+            <a:fld id="{6113E31D-E2AB-40D1-8B51-AFA5AFEF393A}" type="slidenum">
+              <a:rPr lang="en-US" smtClean="0"/>
+              <a:t>13</a:t>
+            </a:fld>
+            <a:endParaRPr lang="en-US" dirty="0"/>
           </a:p>
         </p:txBody>
       </p:sp>
@@ -8984,10 +8980,10 @@
           <a:bodyPr/>
           <a:lstStyle/>
           <a:p>
-            <a:r>
+            <a:fld id="{70BC098B-A214-EA49-B031-57C2674B7D99}" type="datetime1">
               <a:rPr lang="en-US" smtClean="0"/>
-              <a:t>02/02/16</a:t>
-            </a:r>
+              <a:t>1/30/17</a:t>
+            </a:fld>
             <a:endParaRPr lang="en-US" dirty="0"/>
           </a:p>
         </p:txBody>
@@ -9011,29 +9007,6 @@
               <a:rPr lang="en-US" smtClean="0"/>
               <a:t>Jiannan Wang - CMPT 733</a:t>
             </a:r>
-            <a:endParaRPr lang="en-US" dirty="0"/>
-          </a:p>
-        </p:txBody>
-      </p:sp>
-      <p:sp>
-        <p:nvSpPr>
-          <p:cNvPr id="6" name="Slide Number Placeholder 5"/>
-          <p:cNvSpPr>
-            <a:spLocks noGrp="1"/>
-          </p:cNvSpPr>
-          <p:nvPr>
-            <p:ph type="sldNum" sz="quarter" idx="12"/>
-          </p:nvPr>
-        </p:nvSpPr>
-        <p:spPr/>
-        <p:txBody>
-          <a:bodyPr/>
-          <a:lstStyle/>
-          <a:p>
-            <a:fld id="{6113E31D-E2AB-40D1-8B51-AFA5AFEF393A}" type="slidenum">
-              <a:rPr lang="en-US" smtClean="0"/>
-              <a:t>14</a:t>
-            </a:fld>
             <a:endParaRPr lang="en-US" dirty="0"/>
           </a:p>
         </p:txBody>
@@ -9634,7 +9607,29 @@
               <a:rPr lang="en-US" sz="2400" dirty="0"/>
               <a:t>)</a:t>
             </a:r>
-            <a:endParaRPr lang="en-US" sz="2400" dirty="0"/>
+          </a:p>
+        </p:txBody>
+      </p:sp>
+      <p:sp>
+        <p:nvSpPr>
+          <p:cNvPr id="3" name="Slide Number Placeholder 2"/>
+          <p:cNvSpPr>
+            <a:spLocks noGrp="1"/>
+          </p:cNvSpPr>
+          <p:nvPr>
+            <p:ph type="sldNum" sz="quarter" idx="12"/>
+          </p:nvPr>
+        </p:nvSpPr>
+        <p:spPr/>
+        <p:txBody>
+          <a:bodyPr/>
+          <a:lstStyle/>
+          <a:p>
+            <a:fld id="{6113E31D-E2AB-40D1-8B51-AFA5AFEF393A}" type="slidenum">
+              <a:rPr lang="en-US" smtClean="0"/>
+              <a:t>14</a:t>
+            </a:fld>
+            <a:endParaRPr lang="en-US" dirty="0"/>
           </a:p>
         </p:txBody>
       </p:sp>
@@ -9831,8 +9826,8 @@
           </a:p>
         </p:txBody>
       </p:sp>
-      <mc:AlternateContent xmlns:mc="http://schemas.openxmlformats.org/markup-compatibility/2006">
-        <mc:Choice xmlns:a14="http://schemas.microsoft.com/office/drawing/2010/main" Requires="a14">
+      <mc:AlternateContent xmlns:mc="http://schemas.openxmlformats.org/markup-compatibility/2006" xmlns:a14="http://schemas.microsoft.com/office/drawing/2010/main">
+        <mc:Choice Requires="a14">
           <p:sp>
             <p:nvSpPr>
               <p:cNvPr id="3" name="Content Placeholder 2"/>
@@ -10450,7 +10445,7 @@
             </p:txBody>
           </p:sp>
         </mc:Choice>
-        <mc:Fallback>
+        <mc:Fallback xmlns="">
           <p:sp>
             <p:nvSpPr>
               <p:cNvPr id="3" name="Content Placeholder 2"/>
@@ -10499,10 +10494,10 @@
           <a:bodyPr/>
           <a:lstStyle/>
           <a:p>
-            <a:r>
+            <a:fld id="{7EBAA6E3-D4EB-9447-889C-46B563C920A1}" type="datetime1">
               <a:rPr lang="en-US" smtClean="0"/>
-              <a:t>02/02/16</a:t>
-            </a:r>
+              <a:t>1/30/17</a:t>
+            </a:fld>
             <a:endParaRPr lang="en-US" dirty="0"/>
           </a:p>
         </p:txBody>
@@ -10526,29 +10521,6 @@
               <a:rPr lang="en-US" smtClean="0"/>
               <a:t>Jiannan Wang - CMPT 733</a:t>
             </a:r>
-            <a:endParaRPr lang="en-US" dirty="0"/>
-          </a:p>
-        </p:txBody>
-      </p:sp>
-      <p:sp>
-        <p:nvSpPr>
-          <p:cNvPr id="6" name="Slide Number Placeholder 5"/>
-          <p:cNvSpPr>
-            <a:spLocks noGrp="1"/>
-          </p:cNvSpPr>
-          <p:nvPr>
-            <p:ph type="sldNum" sz="quarter" idx="12"/>
-          </p:nvPr>
-        </p:nvSpPr>
-        <p:spPr/>
-        <p:txBody>
-          <a:bodyPr/>
-          <a:lstStyle/>
-          <a:p>
-            <a:fld id="{6113E31D-E2AB-40D1-8B51-AFA5AFEF393A}" type="slidenum">
-              <a:rPr lang="en-US" smtClean="0"/>
-              <a:t>15</a:t>
-            </a:fld>
             <a:endParaRPr lang="en-US" dirty="0"/>
           </a:p>
         </p:txBody>
@@ -11961,6 +11933,29 @@
           </p:sp>
         </p:grpSp>
       </p:grpSp>
+      <p:sp>
+        <p:nvSpPr>
+          <p:cNvPr id="7" name="Slide Number Placeholder 6"/>
+          <p:cNvSpPr>
+            <a:spLocks noGrp="1"/>
+          </p:cNvSpPr>
+          <p:nvPr>
+            <p:ph type="sldNum" sz="quarter" idx="12"/>
+          </p:nvPr>
+        </p:nvSpPr>
+        <p:spPr/>
+        <p:txBody>
+          <a:bodyPr/>
+          <a:lstStyle/>
+          <a:p>
+            <a:fld id="{6113E31D-E2AB-40D1-8B51-AFA5AFEF393A}" type="slidenum">
+              <a:rPr lang="en-US" smtClean="0"/>
+              <a:t>15</a:t>
+            </a:fld>
+            <a:endParaRPr lang="en-US" dirty="0"/>
+          </a:p>
+        </p:txBody>
+      </p:sp>
     </p:spTree>
     <p:extLst>
       <p:ext uri="{BB962C8B-B14F-4D97-AF65-F5344CB8AC3E}">
@@ -12417,10 +12412,10 @@
           <a:bodyPr/>
           <a:lstStyle/>
           <a:p>
-            <a:r>
+            <a:fld id="{7FF48786-60B5-554F-A4DF-4212F5F2A4D8}" type="datetime1">
               <a:rPr lang="en-US" smtClean="0"/>
-              <a:t>02/02/16</a:t>
-            </a:r>
+              <a:t>1/30/17</a:t>
+            </a:fld>
             <a:endParaRPr lang="en-US" dirty="0"/>
           </a:p>
         </p:txBody>
@@ -12448,31 +12443,8 @@
           </a:p>
         </p:txBody>
       </p:sp>
-      <p:sp>
-        <p:nvSpPr>
-          <p:cNvPr id="6" name="Slide Number Placeholder 5"/>
-          <p:cNvSpPr>
-            <a:spLocks noGrp="1"/>
-          </p:cNvSpPr>
-          <p:nvPr>
-            <p:ph type="sldNum" sz="quarter" idx="12"/>
-          </p:nvPr>
-        </p:nvSpPr>
-        <p:spPr/>
-        <p:txBody>
-          <a:bodyPr/>
-          <a:lstStyle/>
-          <a:p>
-            <a:fld id="{6113E31D-E2AB-40D1-8B51-AFA5AFEF393A}" type="slidenum">
-              <a:rPr lang="en-US" smtClean="0"/>
-              <a:t>16</a:t>
-            </a:fld>
-            <a:endParaRPr lang="en-US" dirty="0"/>
-          </a:p>
-        </p:txBody>
-      </p:sp>
-      <mc:AlternateContent xmlns:mc="http://schemas.openxmlformats.org/markup-compatibility/2006">
-        <mc:Choice xmlns:a14="http://schemas.microsoft.com/office/drawing/2010/main" Requires="a14">
+      <mc:AlternateContent xmlns:mc="http://schemas.openxmlformats.org/markup-compatibility/2006" xmlns:a14="http://schemas.microsoft.com/office/drawing/2010/main">
+        <mc:Choice Requires="a14">
           <p:sp>
             <p:nvSpPr>
               <p:cNvPr id="7" name="TextBox 6"/>
@@ -12732,7 +12704,7 @@
                     <m:d>
                       <m:dPr>
                         <m:ctrlPr>
-                          <a:rPr lang="en-US" altLang="zh-CN" sz="2800" b="0" i="0" smtClean="0">
+                          <a:rPr lang="en-US" altLang="zh-CN" sz="2800" b="0" i="1" smtClean="0">
                             <a:latin typeface="Cambria Math" charset="0"/>
                           </a:rPr>
                         </m:ctrlPr>
@@ -12787,7 +12759,7 @@
             </p:txBody>
           </p:sp>
         </mc:Choice>
-        <mc:Fallback>
+        <mc:Fallback xmlns="">
           <p:sp>
             <p:nvSpPr>
               <p:cNvPr id="7" name="TextBox 6"/>
@@ -12831,8 +12803,8 @@
           </p:sp>
         </mc:Fallback>
       </mc:AlternateContent>
-      <mc:AlternateContent xmlns:mc="http://schemas.openxmlformats.org/markup-compatibility/2006">
-        <mc:Choice xmlns:a14="http://schemas.microsoft.com/office/drawing/2010/main" Requires="a14">
+      <mc:AlternateContent xmlns:mc="http://schemas.openxmlformats.org/markup-compatibility/2006" xmlns:a14="http://schemas.microsoft.com/office/drawing/2010/main">
+        <mc:Choice Requires="a14">
           <p:sp>
             <p:nvSpPr>
               <p:cNvPr id="8" name="TextBox 7"/>
@@ -12990,7 +12962,7 @@
             </p:txBody>
           </p:sp>
         </mc:Choice>
-        <mc:Fallback>
+        <mc:Fallback xmlns="">
           <p:sp>
             <p:nvSpPr>
               <p:cNvPr id="8" name="TextBox 7"/>
@@ -13029,6 +13001,29 @@
           </p:sp>
         </mc:Fallback>
       </mc:AlternateContent>
+      <p:sp>
+        <p:nvSpPr>
+          <p:cNvPr id="9" name="Slide Number Placeholder 8"/>
+          <p:cNvSpPr>
+            <a:spLocks noGrp="1"/>
+          </p:cNvSpPr>
+          <p:nvPr>
+            <p:ph type="sldNum" sz="quarter" idx="12"/>
+          </p:nvPr>
+        </p:nvSpPr>
+        <p:spPr/>
+        <p:txBody>
+          <a:bodyPr/>
+          <a:lstStyle/>
+          <a:p>
+            <a:fld id="{6113E31D-E2AB-40D1-8B51-AFA5AFEF393A}" type="slidenum">
+              <a:rPr lang="en-US" smtClean="0"/>
+              <a:t>16</a:t>
+            </a:fld>
+            <a:endParaRPr lang="en-US" dirty="0"/>
+          </a:p>
+        </p:txBody>
+      </p:sp>
     </p:spTree>
     <p:extLst>
       <p:ext uri="{BB962C8B-B14F-4D97-AF65-F5344CB8AC3E}">
@@ -13430,18 +13425,7 @@
                   </a:srgbClr>
                 </a:solidFill>
               </a:rPr>
-              <a:t>Jaccar</a:t>
-            </a:r>
-            <a:r>
-              <a:rPr lang="en-US" altLang="zh-CN" dirty="0" err="1" smtClean="0">
-                <a:solidFill>
-                  <a:srgbClr val="000000">
-                    <a:lumMod val="75000"/>
-                    <a:lumOff val="25000"/>
-                  </a:srgbClr>
-                </a:solidFill>
-              </a:rPr>
-              <a:t>d</a:t>
+              <a:t>Jaccard</a:t>
             </a:r>
             <a:r>
               <a:rPr lang="zh-CN" altLang="en-US" dirty="0" smtClean="0">
@@ -13607,10 +13591,10 @@
           <a:bodyPr/>
           <a:lstStyle/>
           <a:p>
-            <a:r>
+            <a:fld id="{EB3012AE-5792-CC4E-BC21-511A47545F8F}" type="datetime1">
               <a:rPr lang="en-US" smtClean="0"/>
-              <a:t>02/02/16</a:t>
-            </a:r>
+              <a:t>1/30/17</a:t>
+            </a:fld>
             <a:endParaRPr lang="en-US" dirty="0"/>
           </a:p>
         </p:txBody>
@@ -13640,7 +13624,7 @@
       </p:sp>
       <p:sp>
         <p:nvSpPr>
-          <p:cNvPr id="6" name="Slide Number Placeholder 5"/>
+          <p:cNvPr id="7" name="Slide Number Placeholder 6"/>
           <p:cNvSpPr>
             <a:spLocks noGrp="1"/>
           </p:cNvSpPr>
@@ -15411,10 +15395,10 @@
           <a:bodyPr/>
           <a:lstStyle/>
           <a:p>
-            <a:r>
+            <a:fld id="{40CBC58A-2EE0-1349-87DD-D65E8EC32CE7}" type="datetime1">
               <a:rPr lang="en-US" smtClean="0"/>
-              <a:t>02/02/16</a:t>
-            </a:r>
+              <a:t>1/30/17</a:t>
+            </a:fld>
             <a:endParaRPr lang="en-US" dirty="0"/>
           </a:p>
         </p:txBody>
@@ -15444,7 +15428,7 @@
       </p:sp>
       <p:sp>
         <p:nvSpPr>
-          <p:cNvPr id="6" name="Slide Number Placeholder 5"/>
+          <p:cNvPr id="7" name="Slide Number Placeholder 6"/>
           <p:cNvSpPr>
             <a:spLocks noGrp="1"/>
           </p:cNvSpPr>
@@ -15921,10 +15905,10 @@
           <a:bodyPr/>
           <a:lstStyle/>
           <a:p>
-            <a:r>
+            <a:fld id="{33D79D37-3876-FD4E-8CA5-0582BF71B402}" type="datetime1">
               <a:rPr lang="en-US" smtClean="0"/>
-              <a:t>02/02/16</a:t>
-            </a:r>
+              <a:t>1/30/17</a:t>
+            </a:fld>
             <a:endParaRPr lang="en-US" dirty="0"/>
           </a:p>
         </p:txBody>
@@ -15948,29 +15932,6 @@
               <a:rPr lang="en-US" smtClean="0"/>
               <a:t>Jiannan Wang - CMPT 733</a:t>
             </a:r>
-            <a:endParaRPr lang="en-US" dirty="0"/>
-          </a:p>
-        </p:txBody>
-      </p:sp>
-      <p:sp>
-        <p:nvSpPr>
-          <p:cNvPr id="6" name="Slide Number Placeholder 5"/>
-          <p:cNvSpPr>
-            <a:spLocks noGrp="1"/>
-          </p:cNvSpPr>
-          <p:nvPr>
-            <p:ph type="sldNum" sz="quarter" idx="12"/>
-          </p:nvPr>
-        </p:nvSpPr>
-        <p:spPr/>
-        <p:txBody>
-          <a:bodyPr/>
-          <a:lstStyle/>
-          <a:p>
-            <a:fld id="{6113E31D-E2AB-40D1-8B51-AFA5AFEF393A}" type="slidenum">
-              <a:rPr lang="en-US" smtClean="0"/>
-              <a:t>19</a:t>
-            </a:fld>
             <a:endParaRPr lang="en-US" dirty="0"/>
           </a:p>
         </p:txBody>
@@ -16739,117 +16700,192 @@
           </a:p>
         </p:txBody>
       </p:sp>
+      <mc:AlternateContent xmlns:mc="http://schemas.openxmlformats.org/markup-compatibility/2006" xmlns:a14="http://schemas.microsoft.com/office/drawing/2010/main">
+        <mc:Choice Requires="a14">
+          <p:sp>
+            <p:nvSpPr>
+              <p:cNvPr id="3" name="TextBox 2"/>
+              <p:cNvSpPr txBox="1"/>
+              <p:nvPr/>
+            </p:nvSpPr>
+            <p:spPr>
+              <a:xfrm>
+                <a:off x="5485082" y="5180902"/>
+                <a:ext cx="4415376" cy="470000"/>
+              </a:xfrm>
+              <a:prstGeom prst="rect">
+                <a:avLst/>
+              </a:prstGeom>
+              <a:noFill/>
+            </p:spPr>
+            <p:txBody>
+              <a:bodyPr wrap="none" rtlCol="0">
+                <a:spAutoFit/>
+              </a:bodyPr>
+              <a:lstStyle/>
+              <a:p>
+                <a:r>
+                  <a:rPr lang="en-US" altLang="zh-CN" sz="2400" dirty="0" smtClean="0"/>
+                  <a:t>Does</a:t>
+                </a:r>
+                <a:r>
+                  <a:rPr lang="zh-CN" altLang="en-US" sz="2400" dirty="0" smtClean="0"/>
+                  <a:t> </a:t>
+                </a:r>
+                <a:r>
+                  <a:rPr lang="en-US" altLang="zh-CN" sz="2400" dirty="0" smtClean="0"/>
+                  <a:t>it</a:t>
+                </a:r>
+                <a:r>
+                  <a:rPr lang="zh-CN" altLang="en-US" sz="2400" dirty="0" smtClean="0"/>
+                  <a:t> </a:t>
+                </a:r>
+                <a:r>
+                  <a:rPr lang="en-US" altLang="zh-CN" sz="2400" dirty="0" smtClean="0"/>
+                  <a:t>require</a:t>
+                </a:r>
+                <a:r>
+                  <a:rPr lang="zh-CN" altLang="en-US" sz="2400" dirty="0" smtClean="0"/>
+                  <a:t> </a:t>
+                </a:r>
+                <a14:m>
+                  <m:oMath xmlns:m="http://schemas.openxmlformats.org/officeDocument/2006/math">
+                    <m:sSup>
+                      <m:sSupPr>
+                        <m:ctrlPr>
+                          <a:rPr lang="en-US" altLang="zh-CN" sz="2400" b="1" i="1">
+                            <a:solidFill>
+                              <a:srgbClr val="FF0000"/>
+                            </a:solidFill>
+                            <a:latin typeface="Cambria Math" charset="0"/>
+                          </a:rPr>
+                        </m:ctrlPr>
+                      </m:sSupPr>
+                      <m:e>
+                        <m:r>
+                          <a:rPr lang="en-US" altLang="zh-CN" sz="2400" b="1" i="1">
+                            <a:solidFill>
+                              <a:srgbClr val="FF0000"/>
+                            </a:solidFill>
+                            <a:latin typeface="Cambria Math" charset="0"/>
+                          </a:rPr>
+                          <m:t>𝒏</m:t>
+                        </m:r>
+                      </m:e>
+                      <m:sup>
+                        <m:r>
+                          <a:rPr lang="en-US" altLang="zh-CN" sz="2400" b="1" i="1">
+                            <a:solidFill>
+                              <a:srgbClr val="FF0000"/>
+                            </a:solidFill>
+                            <a:latin typeface="Cambria Math" charset="0"/>
+                          </a:rPr>
+                          <m:t>𝟐</m:t>
+                        </m:r>
+                      </m:sup>
+                    </m:sSup>
+                  </m:oMath>
+                </a14:m>
+                <a:r>
+                  <a:rPr lang="zh-CN" altLang="en-US" sz="2400" b="1" dirty="0">
+                    <a:solidFill>
+                      <a:srgbClr val="FF0000"/>
+                    </a:solidFill>
+                  </a:rPr>
+                  <a:t> </a:t>
+                </a:r>
+                <a:r>
+                  <a:rPr lang="en-US" altLang="zh-CN" sz="2400" b="1" dirty="0">
+                    <a:solidFill>
+                      <a:srgbClr val="FF0000"/>
+                    </a:solidFill>
+                  </a:rPr>
+                  <a:t>comparisons</a:t>
+                </a:r>
+                <a:r>
+                  <a:rPr lang="zh-CN" altLang="en-US" sz="2400" b="1" dirty="0">
+                    <a:solidFill>
+                      <a:srgbClr val="FF0000"/>
+                    </a:solidFill>
+                  </a:rPr>
+                  <a:t> </a:t>
+                </a:r>
+                <a:r>
+                  <a:rPr lang="en-US" altLang="zh-CN" sz="2400" b="1" dirty="0" smtClean="0">
+                    <a:solidFill>
+                      <a:srgbClr val="FF0000"/>
+                    </a:solidFill>
+                  </a:rPr>
+                  <a:t>?</a:t>
+                </a:r>
+                <a:r>
+                  <a:rPr lang="zh-CN" altLang="en-US" sz="2400" dirty="0" smtClean="0"/>
+                  <a:t> </a:t>
+                </a:r>
+                <a:endParaRPr lang="en-US" sz="2400" dirty="0"/>
+              </a:p>
+            </p:txBody>
+          </p:sp>
+        </mc:Choice>
+        <mc:Fallback xmlns="">
+          <p:sp>
+            <p:nvSpPr>
+              <p:cNvPr id="3" name="TextBox 2"/>
+              <p:cNvSpPr txBox="1">
+                <a:spLocks noRot="1" noChangeAspect="1" noMove="1" noResize="1" noEditPoints="1" noAdjustHandles="1" noChangeArrowheads="1" noChangeShapeType="1" noTextEdit="1"/>
+              </p:cNvSpPr>
+              <p:nvPr/>
+            </p:nvSpPr>
+            <p:spPr>
+              <a:xfrm>
+                <a:off x="5485082" y="5180902"/>
+                <a:ext cx="4415376" cy="470000"/>
+              </a:xfrm>
+              <a:prstGeom prst="rect">
+                <a:avLst/>
+              </a:prstGeom>
+              <a:blipFill rotWithShape="0">
+                <a:blip r:embed="rId2"/>
+                <a:stretch>
+                  <a:fillRect l="-2210" t="-7792" b="-29870"/>
+                </a:stretch>
+              </a:blipFill>
+            </p:spPr>
+            <p:txBody>
+              <a:bodyPr/>
+              <a:lstStyle/>
+              <a:p>
+                <a:r>
+                  <a:rPr lang="en-US">
+                    <a:noFill/>
+                  </a:rPr>
+                  <a:t> </a:t>
+                </a:r>
+              </a:p>
+            </p:txBody>
+          </p:sp>
+        </mc:Fallback>
+      </mc:AlternateContent>
       <p:sp>
         <p:nvSpPr>
-          <p:cNvPr id="3" name="TextBox 2"/>
-          <p:cNvSpPr txBox="1"/>
-          <p:nvPr/>
+          <p:cNvPr id="15" name="Slide Number Placeholder 14"/>
+          <p:cNvSpPr>
+            <a:spLocks noGrp="1"/>
+          </p:cNvSpPr>
+          <p:nvPr>
+            <p:ph type="sldNum" sz="quarter" idx="12"/>
+          </p:nvPr>
         </p:nvSpPr>
-        <p:spPr>
-          <a:xfrm>
-            <a:off x="5018987" y="5193776"/>
-            <a:ext cx="6817700" cy="461665"/>
-          </a:xfrm>
-          <a:prstGeom prst="rect">
-            <a:avLst/>
-          </a:prstGeom>
-          <a:noFill/>
-        </p:spPr>
+        <p:spPr/>
         <p:txBody>
-          <a:bodyPr wrap="none" rtlCol="0">
-            <a:spAutoFit/>
-          </a:bodyPr>
+          <a:bodyPr/>
           <a:lstStyle/>
           <a:p>
-            <a:r>
-              <a:rPr lang="en-US" altLang="zh-CN" sz="2400" dirty="0" smtClean="0"/>
-              <a:t>#comparisons:</a:t>
-            </a:r>
-            <a:r>
-              <a:rPr lang="zh-CN" altLang="en-US" sz="2400" dirty="0" smtClean="0"/>
-              <a:t> </a:t>
-            </a:r>
-            <a:r>
-              <a:rPr lang="en-US" altLang="zh-CN" sz="2400" dirty="0" smtClean="0"/>
-              <a:t>(</a:t>
-            </a:r>
-            <a:r>
-              <a:rPr lang="zh-CN" altLang="en-US" sz="2400" dirty="0" smtClean="0"/>
-              <a:t> </a:t>
-            </a:r>
-            <a:r>
-              <a:rPr lang="en-US" altLang="zh-CN" sz="2400" dirty="0" err="1" smtClean="0"/>
-              <a:t>n</a:t>
-            </a:r>
-            <a:r>
-              <a:rPr lang="en-US" altLang="zh-CN" sz="2400" baseline="-25000" dirty="0" err="1" smtClean="0"/>
-              <a:t>apple</a:t>
-            </a:r>
-            <a:r>
-              <a:rPr lang="en-US" altLang="zh-CN" sz="2400" dirty="0" smtClean="0"/>
-              <a:t>)</a:t>
-            </a:r>
-            <a:r>
-              <a:rPr lang="en-US" altLang="zh-CN" sz="2400" baseline="30000" dirty="0" smtClean="0"/>
-              <a:t>2</a:t>
-            </a:r>
-            <a:r>
-              <a:rPr lang="en-US" altLang="zh-CN" sz="2400" dirty="0" smtClean="0"/>
-              <a:t>+(</a:t>
-            </a:r>
-            <a:r>
-              <a:rPr lang="en-US" altLang="zh-CN" sz="2400" dirty="0" err="1" smtClean="0"/>
-              <a:t>n</a:t>
-            </a:r>
-            <a:r>
-              <a:rPr lang="en-US" altLang="zh-CN" sz="2400" baseline="-25000" dirty="0" err="1" smtClean="0"/>
-              <a:t>banana</a:t>
-            </a:r>
-            <a:r>
-              <a:rPr lang="en-US" altLang="zh-CN" sz="2400" dirty="0" smtClean="0"/>
-              <a:t>)</a:t>
-            </a:r>
-            <a:r>
-              <a:rPr lang="en-US" altLang="zh-CN" sz="2400" baseline="30000" dirty="0" smtClean="0"/>
-              <a:t>2</a:t>
-            </a:r>
-            <a:r>
-              <a:rPr lang="en-US" altLang="zh-CN" sz="2400" dirty="0" smtClean="0"/>
-              <a:t>+(</a:t>
-            </a:r>
-            <a:r>
-              <a:rPr lang="en-US" altLang="zh-CN" sz="2400" dirty="0" err="1" smtClean="0"/>
-              <a:t>n</a:t>
-            </a:r>
-            <a:r>
-              <a:rPr lang="en-US" altLang="zh-CN" sz="2400" baseline="-25000" dirty="0" err="1" smtClean="0"/>
-              <a:t>orange</a:t>
-            </a:r>
-            <a:r>
-              <a:rPr lang="en-US" altLang="zh-CN" sz="2400" dirty="0" smtClean="0"/>
-              <a:t>)</a:t>
-            </a:r>
-            <a:r>
-              <a:rPr lang="en-US" altLang="zh-CN" sz="2400" baseline="30000" dirty="0" smtClean="0"/>
-              <a:t>2</a:t>
-            </a:r>
-            <a:r>
-              <a:rPr lang="zh-CN" altLang="en-US" sz="2400" baseline="30000" dirty="0" smtClean="0"/>
-              <a:t> </a:t>
-            </a:r>
-            <a:r>
-              <a:rPr lang="en-US" altLang="zh-CN" sz="2400" dirty="0" smtClean="0"/>
-              <a:t>=</a:t>
-            </a:r>
-            <a:r>
-              <a:rPr lang="zh-CN" altLang="en-US" sz="2400" dirty="0" smtClean="0"/>
-              <a:t> </a:t>
-            </a:r>
-            <a:r>
-              <a:rPr lang="en-US" altLang="zh-CN" sz="2400" dirty="0" smtClean="0"/>
-              <a:t>4+4+1=9</a:t>
-            </a:r>
-            <a:endParaRPr lang="en-US" sz="2400" dirty="0"/>
+            <a:fld id="{6113E31D-E2AB-40D1-8B51-AFA5AFEF393A}" type="slidenum">
+              <a:rPr lang="en-US" smtClean="0"/>
+              <a:t>19</a:t>
+            </a:fld>
+            <a:endParaRPr lang="en-US" dirty="0"/>
           </a:p>
         </p:txBody>
       </p:sp>
@@ -17269,10 +17305,10 @@
           <a:bodyPr/>
           <a:lstStyle/>
           <a:p>
-            <a:r>
+            <a:fld id="{E1EB6200-A4F2-2C4C-BD33-96A8FF81B07D}" type="datetime1">
               <a:rPr lang="en-US" smtClean="0"/>
-              <a:t>02/02/16</a:t>
-            </a:r>
+              <a:t>1/30/17</a:t>
+            </a:fld>
             <a:endParaRPr lang="en-US" dirty="0"/>
           </a:p>
         </p:txBody>
@@ -17302,7 +17338,7 @@
       </p:sp>
       <p:sp>
         <p:nvSpPr>
-          <p:cNvPr id="6" name="Slide Number Placeholder 5"/>
+          <p:cNvPr id="7" name="Slide Number Placeholder 6"/>
           <p:cNvSpPr>
             <a:spLocks noGrp="1"/>
           </p:cNvSpPr>
@@ -17679,10 +17715,10 @@
           <a:bodyPr/>
           <a:lstStyle/>
           <a:p>
-            <a:r>
+            <a:fld id="{BA26CCB7-5E92-F943-BEB9-9AA54BB4B5AC}" type="datetime1">
               <a:rPr lang="en-US" smtClean="0"/>
-              <a:t>02/02/16</a:t>
-            </a:r>
+              <a:t>1/30/17</a:t>
+            </a:fld>
             <a:endParaRPr lang="en-US" dirty="0"/>
           </a:p>
         </p:txBody>
@@ -17706,29 +17742,6 @@
               <a:rPr lang="en-US" smtClean="0"/>
               <a:t>Jiannan Wang - CMPT 733</a:t>
             </a:r>
-            <a:endParaRPr lang="en-US" dirty="0"/>
-          </a:p>
-        </p:txBody>
-      </p:sp>
-      <p:sp>
-        <p:nvSpPr>
-          <p:cNvPr id="6" name="Slide Number Placeholder 5"/>
-          <p:cNvSpPr>
-            <a:spLocks noGrp="1"/>
-          </p:cNvSpPr>
-          <p:nvPr>
-            <p:ph type="sldNum" sz="quarter" idx="12"/>
-          </p:nvPr>
-        </p:nvSpPr>
-        <p:spPr/>
-        <p:txBody>
-          <a:bodyPr/>
-          <a:lstStyle/>
-          <a:p>
-            <a:fld id="{6113E31D-E2AB-40D1-8B51-AFA5AFEF393A}" type="slidenum">
-              <a:rPr lang="en-US" smtClean="0"/>
-              <a:t>20</a:t>
-            </a:fld>
             <a:endParaRPr lang="en-US" dirty="0"/>
           </a:p>
         </p:txBody>
@@ -18858,6 +18871,29 @@
               <a:rPr lang="zh-CN" altLang="en-US" dirty="0"/>
               <a:t> </a:t>
             </a:r>
+            <a:endParaRPr lang="en-US" dirty="0"/>
+          </a:p>
+        </p:txBody>
+      </p:sp>
+      <p:sp>
+        <p:nvSpPr>
+          <p:cNvPr id="14" name="Slide Number Placeholder 13"/>
+          <p:cNvSpPr>
+            <a:spLocks noGrp="1"/>
+          </p:cNvSpPr>
+          <p:nvPr>
+            <p:ph type="sldNum" sz="quarter" idx="12"/>
+          </p:nvPr>
+        </p:nvSpPr>
+        <p:spPr/>
+        <p:txBody>
+          <a:bodyPr/>
+          <a:lstStyle/>
+          <a:p>
+            <a:fld id="{6113E31D-E2AB-40D1-8B51-AFA5AFEF393A}" type="slidenum">
+              <a:rPr lang="en-US" smtClean="0"/>
+              <a:t>20</a:t>
+            </a:fld>
             <a:endParaRPr lang="en-US" dirty="0"/>
           </a:p>
         </p:txBody>
@@ -20285,10 +20321,10 @@
           <a:bodyPr/>
           <a:lstStyle/>
           <a:p>
-            <a:r>
+            <a:fld id="{7650D948-EFAE-4A40-8F1F-879A4508DD90}" type="datetime1">
               <a:rPr lang="en-US" smtClean="0"/>
-              <a:t>02/02/16</a:t>
-            </a:r>
+              <a:t>1/30/17</a:t>
+            </a:fld>
             <a:endParaRPr lang="en-US" dirty="0"/>
           </a:p>
         </p:txBody>
@@ -20312,29 +20348,6 @@
               <a:rPr lang="en-US" smtClean="0"/>
               <a:t>Jiannan Wang - CMPT 733</a:t>
             </a:r>
-            <a:endParaRPr lang="en-US" dirty="0"/>
-          </a:p>
-        </p:txBody>
-      </p:sp>
-      <p:sp>
-        <p:nvSpPr>
-          <p:cNvPr id="6" name="Slide Number Placeholder 5"/>
-          <p:cNvSpPr>
-            <a:spLocks noGrp="1"/>
-          </p:cNvSpPr>
-          <p:nvPr>
-            <p:ph type="sldNum" sz="quarter" idx="12"/>
-          </p:nvPr>
-        </p:nvSpPr>
-        <p:spPr/>
-        <p:txBody>
-          <a:bodyPr/>
-          <a:lstStyle/>
-          <a:p>
-            <a:fld id="{6113E31D-E2AB-40D1-8B51-AFA5AFEF393A}" type="slidenum">
-              <a:rPr lang="en-US" smtClean="0"/>
-              <a:t>21</a:t>
-            </a:fld>
             <a:endParaRPr lang="en-US" dirty="0"/>
           </a:p>
         </p:txBody>
@@ -20400,6 +20413,29 @@
               <a:rPr lang="en-US" altLang="zh-CN" dirty="0"/>
               <a:t>SIGMOD 2012:85-96.</a:t>
             </a:r>
+            <a:endParaRPr lang="en-US" dirty="0"/>
+          </a:p>
+        </p:txBody>
+      </p:sp>
+      <p:sp>
+        <p:nvSpPr>
+          <p:cNvPr id="8" name="Slide Number Placeholder 7"/>
+          <p:cNvSpPr>
+            <a:spLocks noGrp="1"/>
+          </p:cNvSpPr>
+          <p:nvPr>
+            <p:ph type="sldNum" sz="quarter" idx="12"/>
+          </p:nvPr>
+        </p:nvSpPr>
+        <p:spPr/>
+        <p:txBody>
+          <a:bodyPr/>
+          <a:lstStyle/>
+          <a:p>
+            <a:fld id="{6113E31D-E2AB-40D1-8B51-AFA5AFEF393A}" type="slidenum">
+              <a:rPr lang="en-US" smtClean="0"/>
+              <a:t>21</a:t>
+            </a:fld>
             <a:endParaRPr lang="en-US" dirty="0"/>
           </a:p>
         </p:txBody>
@@ -20860,8 +20896,8 @@
           </a:p>
         </p:txBody>
       </p:sp>
-      <mc:AlternateContent xmlns:mc="http://schemas.openxmlformats.org/markup-compatibility/2006">
-        <mc:Choice xmlns:a14="http://schemas.microsoft.com/office/drawing/2010/main" Requires="a14">
+      <mc:AlternateContent xmlns:mc="http://schemas.openxmlformats.org/markup-compatibility/2006" xmlns:a14="http://schemas.microsoft.com/office/drawing/2010/main">
+        <mc:Choice Requires="a14">
           <p:sp>
             <p:nvSpPr>
               <p:cNvPr id="3" name="Content Placeholder 2"/>
@@ -21498,18 +21534,7 @@
                       </a:srgbClr>
                     </a:solidFill>
                   </a:rPr>
-                  <a:t>vectors</a:t>
-                </a:r>
-                <a:r>
-                  <a:rPr lang="en-US" altLang="zh-CN" sz="2400" dirty="0" smtClean="0">
-                    <a:solidFill>
-                      <a:srgbClr val="000000">
-                        <a:lumMod val="75000"/>
-                        <a:lumOff val="25000"/>
-                      </a:srgbClr>
-                    </a:solidFill>
-                  </a:rPr>
-                  <a:t>?</a:t>
+                  <a:t>vectors?</a:t>
                 </a:r>
                 <a:r>
                   <a:rPr lang="zh-CN" altLang="en-US" sz="2400" dirty="0" smtClean="0">
@@ -21693,29 +21718,7 @@
                       </a:srgbClr>
                     </a:solidFill>
                   </a:rPr>
-                  <a:t>Ir</a:t>
-                </a:r>
-                <a:r>
-                  <a:rPr lang="en-US" altLang="zh-CN" sz="2400" dirty="0" smtClean="0">
-                    <a:solidFill>
-                      <a:srgbClr val="000000">
-                        <a:lumMod val="75000"/>
-                        <a:lumOff val="25000"/>
-                      </a:srgbClr>
-                    </a:solidFill>
-                  </a:rPr>
-                  <a:t>o</a:t>
-                </a:r>
-                <a:r>
-                  <a:rPr lang="en-US" altLang="zh-CN" sz="2400" dirty="0" smtClean="0">
-                    <a:solidFill>
-                      <a:srgbClr val="000000">
-                        <a:lumMod val="75000"/>
-                        <a:lumOff val="25000"/>
-                      </a:srgbClr>
-                    </a:solidFill>
-                  </a:rPr>
-                  <a:t>n</a:t>
+                  <a:t>Iron</a:t>
                 </a:r>
                 <a:r>
                   <a:rPr lang="zh-CN" altLang="en-US" sz="2400" dirty="0" smtClean="0">
@@ -21820,7 +21823,7 @@
             </p:txBody>
           </p:sp>
         </mc:Choice>
-        <mc:Fallback>
+        <mc:Fallback xmlns="">
           <p:sp>
             <p:nvSpPr>
               <p:cNvPr id="3" name="Content Placeholder 2"/>
@@ -21873,10 +21876,10 @@
           <a:bodyPr/>
           <a:lstStyle/>
           <a:p>
-            <a:r>
+            <a:fld id="{0CB90E90-00BE-6D47-8B23-DA610545AA96}" type="datetime1">
               <a:rPr lang="en-US" smtClean="0"/>
-              <a:t>02/02/16</a:t>
-            </a:r>
+              <a:t>1/30/17</a:t>
+            </a:fld>
             <a:endParaRPr lang="en-US" dirty="0"/>
           </a:p>
         </p:txBody>
@@ -21900,29 +21903,6 @@
               <a:rPr lang="en-US" smtClean="0"/>
               <a:t>Jiannan Wang - CMPT 733</a:t>
             </a:r>
-            <a:endParaRPr lang="en-US" dirty="0"/>
-          </a:p>
-        </p:txBody>
-      </p:sp>
-      <p:sp>
-        <p:nvSpPr>
-          <p:cNvPr id="6" name="Slide Number Placeholder 5"/>
-          <p:cNvSpPr>
-            <a:spLocks noGrp="1"/>
-          </p:cNvSpPr>
-          <p:nvPr>
-            <p:ph type="sldNum" sz="quarter" idx="12"/>
-          </p:nvPr>
-        </p:nvSpPr>
-        <p:spPr/>
-        <p:txBody>
-          <a:bodyPr/>
-          <a:lstStyle/>
-          <a:p>
-            <a:fld id="{6113E31D-E2AB-40D1-8B51-AFA5AFEF393A}" type="slidenum">
-              <a:rPr lang="en-US" smtClean="0"/>
-              <a:t>22</a:t>
-            </a:fld>
             <a:endParaRPr lang="en-US" dirty="0"/>
           </a:p>
         </p:txBody>
@@ -21970,6 +21950,29 @@
               <a:rPr lang="en-US" sz="2000" dirty="0"/>
               <a:t>. In KDD, pages 39–48, 2003</a:t>
             </a:r>
+          </a:p>
+        </p:txBody>
+      </p:sp>
+      <p:sp>
+        <p:nvSpPr>
+          <p:cNvPr id="8" name="Slide Number Placeholder 7"/>
+          <p:cNvSpPr>
+            <a:spLocks noGrp="1"/>
+          </p:cNvSpPr>
+          <p:nvPr>
+            <p:ph type="sldNum" sz="quarter" idx="12"/>
+          </p:nvPr>
+        </p:nvSpPr>
+        <p:spPr/>
+        <p:txBody>
+          <a:bodyPr/>
+          <a:lstStyle/>
+          <a:p>
+            <a:fld id="{6113E31D-E2AB-40D1-8B51-AFA5AFEF393A}" type="slidenum">
+              <a:rPr lang="en-US" smtClean="0"/>
+              <a:t>22</a:t>
+            </a:fld>
+            <a:endParaRPr lang="en-US" dirty="0"/>
           </a:p>
         </p:txBody>
       </p:sp>
@@ -22397,10 +22400,10 @@
           <a:bodyPr/>
           <a:lstStyle/>
           <a:p>
-            <a:r>
+            <a:fld id="{413A8410-0500-544F-B79F-FB0072154FA8}" type="datetime1">
               <a:rPr lang="en-US" smtClean="0"/>
-              <a:t>02/02/16</a:t>
-            </a:r>
+              <a:t>1/30/17</a:t>
+            </a:fld>
             <a:endParaRPr lang="en-US" dirty="0"/>
           </a:p>
         </p:txBody>
@@ -22428,31 +22431,8 @@
           </a:p>
         </p:txBody>
       </p:sp>
-      <p:sp>
-        <p:nvSpPr>
-          <p:cNvPr id="6" name="Slide Number Placeholder 5"/>
-          <p:cNvSpPr>
-            <a:spLocks noGrp="1"/>
-          </p:cNvSpPr>
-          <p:nvPr>
-            <p:ph type="sldNum" sz="quarter" idx="12"/>
-          </p:nvPr>
-        </p:nvSpPr>
-        <p:spPr/>
-        <p:txBody>
-          <a:bodyPr/>
-          <a:lstStyle/>
-          <a:p>
-            <a:fld id="{6113E31D-E2AB-40D1-8B51-AFA5AFEF393A}" type="slidenum">
-              <a:rPr lang="en-US" smtClean="0"/>
-              <a:t>23</a:t>
-            </a:fld>
-            <a:endParaRPr lang="en-US" dirty="0"/>
-          </a:p>
-        </p:txBody>
-      </p:sp>
-      <mc:AlternateContent xmlns:mc="http://schemas.openxmlformats.org/markup-compatibility/2006">
-        <mc:Choice xmlns:a14="http://schemas.microsoft.com/office/drawing/2010/main" Requires="a14">
+      <mc:AlternateContent xmlns:mc="http://schemas.openxmlformats.org/markup-compatibility/2006" xmlns:a14="http://schemas.microsoft.com/office/drawing/2010/main">
+        <mc:Choice Requires="a14">
           <p:sp>
             <p:nvSpPr>
               <p:cNvPr id="7" name="Content Placeholder 6"/>
@@ -22494,8 +22474,12 @@
                   <a:t> </a:t>
                 </a:r>
                 <a:r>
+                  <a:rPr lang="en-US" altLang="zh-CN" dirty="0"/>
+                  <a:t>P</a:t>
+                </a:r>
+                <a:r>
                   <a:rPr lang="en-US" altLang="zh-CN" dirty="0" smtClean="0"/>
-                  <a:t>pipeline</a:t>
+                  <a:t>ipeline</a:t>
                 </a:r>
                 <a:endParaRPr lang="zh-CN" altLang="en-US" dirty="0" smtClean="0"/>
               </a:p>
@@ -23302,7 +23286,7 @@
             </p:txBody>
           </p:sp>
         </mc:Choice>
-        <mc:Fallback>
+        <mc:Fallback xmlns="">
           <p:sp>
             <p:nvSpPr>
               <p:cNvPr id="7" name="Content Placeholder 6"/>
@@ -23343,6 +23327,29 @@
           </p:sp>
         </mc:Fallback>
       </mc:AlternateContent>
+      <p:sp>
+        <p:nvSpPr>
+          <p:cNvPr id="3" name="Slide Number Placeholder 2"/>
+          <p:cNvSpPr>
+            <a:spLocks noGrp="1"/>
+          </p:cNvSpPr>
+          <p:nvPr>
+            <p:ph type="sldNum" sz="quarter" idx="12"/>
+          </p:nvPr>
+        </p:nvSpPr>
+        <p:spPr/>
+        <p:txBody>
+          <a:bodyPr/>
+          <a:lstStyle/>
+          <a:p>
+            <a:fld id="{6113E31D-E2AB-40D1-8B51-AFA5AFEF393A}" type="slidenum">
+              <a:rPr lang="en-US" smtClean="0"/>
+              <a:t>23</a:t>
+            </a:fld>
+            <a:endParaRPr lang="en-US" dirty="0"/>
+          </a:p>
+        </p:txBody>
+      </p:sp>
     </p:spTree>
     <p:extLst>
       <p:ext uri="{BB962C8B-B14F-4D97-AF65-F5344CB8AC3E}">
@@ -23593,10 +23600,10 @@
           <a:bodyPr/>
           <a:lstStyle/>
           <a:p>
-            <a:r>
+            <a:fld id="{E31F56F4-396C-554F-A208-7DFCD8C328BB}" type="datetime1">
               <a:rPr lang="en-US" smtClean="0"/>
-              <a:t>02/02/16</a:t>
-            </a:r>
+              <a:t>1/30/17</a:t>
+            </a:fld>
             <a:endParaRPr lang="en-US" dirty="0"/>
           </a:p>
         </p:txBody>
@@ -23620,29 +23627,6 @@
               <a:rPr lang="en-US" smtClean="0"/>
               <a:t>Jiannan Wang - CMPT 733</a:t>
             </a:r>
-            <a:endParaRPr lang="en-US" dirty="0"/>
-          </a:p>
-        </p:txBody>
-      </p:sp>
-      <p:sp>
-        <p:nvSpPr>
-          <p:cNvPr id="6" name="Slide Number Placeholder 5"/>
-          <p:cNvSpPr>
-            <a:spLocks noGrp="1"/>
-          </p:cNvSpPr>
-          <p:nvPr>
-            <p:ph type="sldNum" sz="quarter" idx="12"/>
-          </p:nvPr>
-        </p:nvSpPr>
-        <p:spPr/>
-        <p:txBody>
-          <a:bodyPr/>
-          <a:lstStyle/>
-          <a:p>
-            <a:fld id="{6113E31D-E2AB-40D1-8B51-AFA5AFEF393A}" type="slidenum">
-              <a:rPr lang="en-US" smtClean="0"/>
-              <a:t>24</a:t>
-            </a:fld>
             <a:endParaRPr lang="en-US" dirty="0"/>
           </a:p>
         </p:txBody>
@@ -23756,18 +23740,35 @@
           <a:lstStyle/>
           <a:p>
             <a:r>
-              <a:rPr lang="en-US" altLang="zh-CN" sz="2400" dirty="0">
-                <a:hlinkClick r:id="rId3"/>
-              </a:rPr>
-              <a:t>http://</a:t>
-            </a:r>
-            <a:r>
               <a:rPr lang="en-US" altLang="zh-CN" sz="2400" dirty="0" smtClean="0">
                 <a:hlinkClick r:id="rId3"/>
               </a:rPr>
-              <a:t>tiny.cc/cmpt733-sp16-a4</a:t>
+              <a:t>http://tiny.cc/cmpt733-a4</a:t>
             </a:r>
             <a:endParaRPr lang="zh-CN" altLang="en-US" sz="2400" dirty="0" smtClean="0"/>
+          </a:p>
+        </p:txBody>
+      </p:sp>
+      <p:sp>
+        <p:nvSpPr>
+          <p:cNvPr id="9" name="Slide Number Placeholder 8"/>
+          <p:cNvSpPr>
+            <a:spLocks noGrp="1"/>
+          </p:cNvSpPr>
+          <p:nvPr>
+            <p:ph type="sldNum" sz="quarter" idx="12"/>
+          </p:nvPr>
+        </p:nvSpPr>
+        <p:spPr/>
+        <p:txBody>
+          <a:bodyPr/>
+          <a:lstStyle/>
+          <a:p>
+            <a:fld id="{6113E31D-E2AB-40D1-8B51-AFA5AFEF393A}" type="slidenum">
+              <a:rPr lang="en-US" smtClean="0"/>
+              <a:t>24</a:t>
+            </a:fld>
+            <a:endParaRPr lang="en-US" dirty="0"/>
           </a:p>
         </p:txBody>
       </p:sp>
@@ -23879,14 +23880,6 @@
             </a:r>
             <a:r>
               <a:rPr lang="en-US" altLang="zh-CN" dirty="0" smtClean="0"/>
-              <a:t>initial</a:t>
-            </a:r>
-            <a:r>
-              <a:rPr lang="zh-CN" altLang="en-US" dirty="0" smtClean="0"/>
-              <a:t> </a:t>
-            </a:r>
-            <a:r>
-              <a:rPr lang="en-US" altLang="zh-CN" dirty="0" smtClean="0"/>
               <a:t>thoughts</a:t>
             </a:r>
             <a:endParaRPr lang="zh-CN" altLang="en-US" dirty="0" smtClean="0"/>
@@ -24594,10 +24587,10 @@
           <a:bodyPr/>
           <a:lstStyle/>
           <a:p>
-            <a:r>
+            <a:fld id="{C7EFD866-9FB6-E04E-8FBF-4C63594CC45C}" type="datetime1">
               <a:rPr lang="en-US" smtClean="0"/>
-              <a:t>02/02/16</a:t>
-            </a:r>
+              <a:t>1/30/17</a:t>
+            </a:fld>
             <a:endParaRPr lang="en-US" dirty="0"/>
           </a:p>
         </p:txBody>
@@ -24627,7 +24620,7 @@
       </p:sp>
       <p:sp>
         <p:nvSpPr>
-          <p:cNvPr id="6" name="Slide Number Placeholder 5"/>
+          <p:cNvPr id="7" name="Slide Number Placeholder 6"/>
           <p:cNvSpPr>
             <a:spLocks noGrp="1"/>
           </p:cNvSpPr>
@@ -24748,10 +24741,10 @@
           <a:bodyPr/>
           <a:lstStyle/>
           <a:p>
-            <a:r>
+            <a:fld id="{D4859C13-DCEF-AE49-B9E4-4A00536B4517}" type="datetime1">
               <a:rPr lang="en-US" smtClean="0"/>
-              <a:t>02/02/16</a:t>
-            </a:r>
+              <a:t>1/30/17</a:t>
+            </a:fld>
             <a:endParaRPr lang="en-US" dirty="0"/>
           </a:p>
         </p:txBody>
@@ -24775,29 +24768,6 @@
               <a:rPr lang="en-US" smtClean="0"/>
               <a:t>Jiannan Wang - CMPT 733</a:t>
             </a:r>
-            <a:endParaRPr lang="en-US" dirty="0"/>
-          </a:p>
-        </p:txBody>
-      </p:sp>
-      <p:sp>
-        <p:nvSpPr>
-          <p:cNvPr id="6" name="Slide Number Placeholder 5"/>
-          <p:cNvSpPr>
-            <a:spLocks noGrp="1"/>
-          </p:cNvSpPr>
-          <p:nvPr>
-            <p:ph type="sldNum" sz="quarter" idx="12"/>
-          </p:nvPr>
-        </p:nvSpPr>
-        <p:spPr/>
-        <p:txBody>
-          <a:bodyPr/>
-          <a:lstStyle/>
-          <a:p>
-            <a:fld id="{6113E31D-E2AB-40D1-8B51-AFA5AFEF393A}" type="slidenum">
-              <a:rPr lang="en-US" smtClean="0"/>
-              <a:t>3</a:t>
-            </a:fld>
             <a:endParaRPr lang="en-US" dirty="0"/>
           </a:p>
         </p:txBody>
@@ -24826,6 +24796,29 @@
           </a:prstGeom>
         </p:spPr>
       </p:pic>
+      <p:sp>
+        <p:nvSpPr>
+          <p:cNvPr id="7" name="Slide Number Placeholder 6"/>
+          <p:cNvSpPr>
+            <a:spLocks noGrp="1"/>
+          </p:cNvSpPr>
+          <p:nvPr>
+            <p:ph type="sldNum" sz="quarter" idx="12"/>
+          </p:nvPr>
+        </p:nvSpPr>
+        <p:spPr/>
+        <p:txBody>
+          <a:bodyPr/>
+          <a:lstStyle/>
+          <a:p>
+            <a:fld id="{6113E31D-E2AB-40D1-8B51-AFA5AFEF393A}" type="slidenum">
+              <a:rPr lang="en-US" smtClean="0"/>
+              <a:t>3</a:t>
+            </a:fld>
+            <a:endParaRPr lang="en-US" dirty="0"/>
+          </a:p>
+        </p:txBody>
+      </p:sp>
     </p:spTree>
     <p:extLst>
       <p:ext uri="{BB962C8B-B14F-4D97-AF65-F5344CB8AC3E}">
@@ -24995,11 +24988,7 @@
             </a:r>
             <a:r>
               <a:rPr lang="en-US" dirty="0" smtClean="0"/>
-              <a:t> </a:t>
-            </a:r>
-            <a:r>
-              <a:rPr lang="en-US" dirty="0" smtClean="0"/>
-              <a:t>it </a:t>
+              <a:t> it </a:t>
             </a:r>
             <a:r>
               <a:rPr lang="en-US" altLang="zh-CN" dirty="0" smtClean="0"/>
@@ -25034,12 +25023,12 @@
         <p:spPr>
           <a:xfrm>
             <a:off x="1097280" y="1845733"/>
-            <a:ext cx="7731410" cy="4728487"/>
+            <a:ext cx="7557989" cy="4728487"/>
           </a:xfrm>
         </p:spPr>
         <p:txBody>
           <a:bodyPr>
-            <a:normAutofit lnSpcReduction="10000"/>
+            <a:normAutofit fontScale="92500"/>
           </a:bodyPr>
           <a:lstStyle/>
           <a:p>
@@ -25063,7 +25052,73 @@
                   </a:srgbClr>
                 </a:solidFill>
               </a:rPr>
-              <a:t>Use domain knowledge to ask questions </a:t>
+              <a:t>Use domain knowledge to ask questions and</a:t>
+            </a:r>
+            <a:r>
+              <a:rPr lang="zh-CN" altLang="en-US" sz="2400" dirty="0" smtClean="0">
+                <a:solidFill>
+                  <a:srgbClr val="000000">
+                    <a:lumMod val="75000"/>
+                    <a:lumOff val="25000"/>
+                  </a:srgbClr>
+                </a:solidFill>
+              </a:rPr>
+              <a:t> </a:t>
+            </a:r>
+            <a:r>
+              <a:rPr lang="en-US" altLang="zh-CN" sz="2400" dirty="0" smtClean="0">
+                <a:solidFill>
+                  <a:srgbClr val="000000">
+                    <a:lumMod val="75000"/>
+                    <a:lumOff val="25000"/>
+                  </a:srgbClr>
+                </a:solidFill>
+              </a:rPr>
+              <a:t>find</a:t>
+            </a:r>
+            <a:r>
+              <a:rPr lang="zh-CN" altLang="en-US" sz="2400" dirty="0" smtClean="0">
+                <a:solidFill>
+                  <a:srgbClr val="000000">
+                    <a:lumMod val="75000"/>
+                    <a:lumOff val="25000"/>
+                  </a:srgbClr>
+                </a:solidFill>
+              </a:rPr>
+              <a:t> </a:t>
+            </a:r>
+            <a:r>
+              <a:rPr lang="en-US" altLang="zh-CN" sz="2400" dirty="0" smtClean="0">
+                <a:solidFill>
+                  <a:srgbClr val="000000">
+                    <a:lumMod val="75000"/>
+                    <a:lumOff val="25000"/>
+                  </a:srgbClr>
+                </a:solidFill>
+              </a:rPr>
+              <a:t>related</a:t>
+            </a:r>
+            <a:r>
+              <a:rPr lang="zh-CN" altLang="en-US" sz="2400" dirty="0" smtClean="0">
+                <a:solidFill>
+                  <a:srgbClr val="000000">
+                    <a:lumMod val="75000"/>
+                    <a:lumOff val="25000"/>
+                  </a:srgbClr>
+                </a:solidFill>
+              </a:rPr>
+              <a:t> </a:t>
+            </a:r>
+            <a:r>
+              <a:rPr lang="en-US" altLang="zh-CN" sz="2400" dirty="0" smtClean="0">
+                <a:solidFill>
+                  <a:srgbClr val="000000">
+                    <a:lumMod val="75000"/>
+                    <a:lumOff val="25000"/>
+                  </a:srgbClr>
+                </a:solidFill>
+              </a:rPr>
+              <a:t>data</a:t>
             </a:r>
           </a:p>
           <a:p>
@@ -25081,7 +25136,18 @@
                   </a:srgbClr>
                 </a:solidFill>
               </a:rPr>
-              <a:t>E.g., Will Donald Trump become the president of </a:t>
+              <a:t>E.g., Which </a:t>
+            </a:r>
+            <a:r>
+              <a:rPr lang="en-US" altLang="zh-CN" sz="2400" dirty="0">
+                <a:solidFill>
+                  <a:srgbClr val="000000">
+                    <a:lumMod val="75000"/>
+                    <a:lumOff val="25000"/>
+                  </a:srgbClr>
+                </a:solidFill>
+              </a:rPr>
+              <a:t>customers are likely to leave your </a:t>
             </a:r>
             <a:r>
               <a:rPr lang="en-US" altLang="zh-CN" sz="2400" dirty="0" smtClean="0">
@@ -25092,7 +25158,7 @@
                   </a:srgbClr>
                 </a:solidFill>
               </a:rPr>
-              <a:t>USA? </a:t>
+              <a:t>company? </a:t>
             </a:r>
             <a:endParaRPr lang="en-US" dirty="0" smtClean="0"/>
           </a:p>
@@ -25136,7 +25202,18 @@
                   </a:srgbClr>
                 </a:solidFill>
               </a:rPr>
-              <a:t>E.g., Design an algorithm that can make the prediction </a:t>
+              <a:t>E.g., Design an algorithm that can make the prediction based</a:t>
+            </a:r>
+            <a:r>
+              <a:rPr lang="zh-CN" altLang="en-US" sz="2400" dirty="0" smtClean="0">
+                <a:solidFill>
+                  <a:srgbClr val="000000">
+                    <a:lumMod val="75000"/>
+                    <a:lumOff val="25000"/>
+                  </a:srgbClr>
+                </a:solidFill>
+              </a:rPr>
+              <a:t> </a:t>
             </a:r>
             <a:r>
               <a:rPr lang="en-US" altLang="zh-CN" sz="2400" dirty="0" smtClean="0">
@@ -25147,7 +25224,7 @@
                   </a:srgbClr>
                 </a:solidFill>
               </a:rPr>
-              <a:t>based</a:t>
+              <a:t>on</a:t>
             </a:r>
             <a:r>
               <a:rPr lang="zh-CN" altLang="en-US" sz="2400" dirty="0" smtClean="0">
@@ -25169,51 +25246,7 @@
                   </a:srgbClr>
                 </a:solidFill>
               </a:rPr>
-              <a:t>on</a:t>
-            </a:r>
-            <a:r>
-              <a:rPr lang="zh-CN" altLang="en-US" sz="2400" dirty="0" smtClean="0">
-                <a:solidFill>
-                  <a:srgbClr val="000000">
-                    <a:lumMod val="75000"/>
-                    <a:lumOff val="25000"/>
-                  </a:srgbClr>
-                </a:solidFill>
-              </a:rPr>
-              <a:t> </a:t>
-            </a:r>
-            <a:r>
-              <a:rPr lang="en-US" altLang="zh-CN" sz="2400" dirty="0" smtClean="0">
-                <a:solidFill>
-                  <a:srgbClr val="000000">
-                    <a:lumMod val="75000"/>
-                    <a:lumOff val="25000"/>
-                  </a:srgbClr>
-                </a:solidFill>
-              </a:rPr>
-              <a:t>social</a:t>
-            </a:r>
-            <a:r>
-              <a:rPr lang="zh-CN" altLang="en-US" sz="2400" dirty="0" smtClean="0">
-                <a:solidFill>
-                  <a:srgbClr val="000000">
-                    <a:lumMod val="75000"/>
-                    <a:lumOff val="25000"/>
-                  </a:srgbClr>
-                </a:solidFill>
-              </a:rPr>
-              <a:t> </a:t>
-            </a:r>
-            <a:r>
-              <a:rPr lang="en-US" altLang="zh-CN" sz="2400" dirty="0" smtClean="0">
-                <a:solidFill>
-                  <a:srgbClr val="000000">
-                    <a:lumMod val="75000"/>
-                    <a:lumOff val="25000"/>
-                  </a:srgbClr>
-                </a:solidFill>
-              </a:rPr>
-              <a:t>media</a:t>
+              <a:t>enterprise</a:t>
             </a:r>
             <a:r>
               <a:rPr lang="zh-CN" altLang="en-US" sz="2400" dirty="0" smtClean="0">
@@ -25269,18 +25302,7 @@
                   </a:srgbClr>
                 </a:solidFill>
               </a:rPr>
-              <a:t>Use programming skills to build </a:t>
-            </a:r>
-            <a:r>
-              <a:rPr lang="en-US" altLang="zh-CN" sz="2400" dirty="0" smtClean="0">
-                <a:solidFill>
-                  <a:srgbClr val="000000">
-                    <a:lumMod val="75000"/>
-                    <a:lumOff val="25000"/>
-                  </a:srgbClr>
-                </a:solidFill>
-              </a:rPr>
-              <a:t>a</a:t>
+              <a:t>Use programming skills to build a</a:t>
             </a:r>
             <a:r>
               <a:rPr lang="zh-CN" altLang="en-US" sz="2400" dirty="0" smtClean="0">
@@ -25405,29 +25427,7 @@
                   </a:srgbClr>
                 </a:solidFill>
               </a:rPr>
-              <a:t>social</a:t>
-            </a:r>
-            <a:r>
-              <a:rPr lang="zh-CN" altLang="en-US" sz="2400" dirty="0" smtClean="0">
-                <a:solidFill>
-                  <a:srgbClr val="000000">
-                    <a:lumMod val="75000"/>
-                    <a:lumOff val="25000"/>
-                  </a:srgbClr>
-                </a:solidFill>
-              </a:rPr>
-              <a:t> </a:t>
-            </a:r>
-            <a:r>
-              <a:rPr lang="en-US" altLang="zh-CN" sz="2400" dirty="0" smtClean="0">
-                <a:solidFill>
-                  <a:srgbClr val="000000">
-                    <a:lumMod val="75000"/>
-                    <a:lumOff val="25000"/>
-                  </a:srgbClr>
-                </a:solidFill>
-              </a:rPr>
-              <a:t>media</a:t>
+              <a:t>enterprise</a:t>
             </a:r>
             <a:r>
               <a:rPr lang="zh-CN" altLang="en-US" sz="2400" dirty="0" smtClean="0">
@@ -25616,10 +25616,10 @@
           <a:bodyPr/>
           <a:lstStyle/>
           <a:p>
-            <a:r>
+            <a:fld id="{4D7FFE9D-FB4F-C548-A061-87EC4C716F99}" type="datetime1">
               <a:rPr lang="en-US" smtClean="0"/>
-              <a:t>02/02/16</a:t>
-            </a:r>
+              <a:t>1/30/17</a:t>
+            </a:fld>
             <a:endParaRPr lang="en-US" dirty="0"/>
           </a:p>
         </p:txBody>
@@ -25649,44 +25649,21 @@
       </p:sp>
       <p:sp>
         <p:nvSpPr>
-          <p:cNvPr id="6" name="Slide Number Placeholder 5"/>
-          <p:cNvSpPr>
-            <a:spLocks noGrp="1"/>
-          </p:cNvSpPr>
-          <p:nvPr>
-            <p:ph type="sldNum" sz="quarter" idx="12"/>
-          </p:nvPr>
-        </p:nvSpPr>
-        <p:spPr/>
-        <p:txBody>
-          <a:bodyPr/>
-          <a:lstStyle/>
-          <a:p>
-            <a:fld id="{6113E31D-E2AB-40D1-8B51-AFA5AFEF393A}" type="slidenum">
-              <a:rPr lang="en-US" smtClean="0"/>
-              <a:t>4</a:t>
-            </a:fld>
-            <a:endParaRPr lang="en-US" dirty="0"/>
-          </a:p>
-        </p:txBody>
-      </p:sp>
-      <p:sp>
-        <p:nvSpPr>
           <p:cNvPr id="7" name="Line Callout 1 6"/>
           <p:cNvSpPr/>
           <p:nvPr/>
         </p:nvSpPr>
         <p:spPr>
           <a:xfrm>
-            <a:off x="8390454" y="1817466"/>
-            <a:ext cx="3685931" cy="1018331"/>
+            <a:off x="9065971" y="1862666"/>
+            <a:ext cx="2679339" cy="1118294"/>
           </a:xfrm>
           <a:prstGeom prst="borderCallout1">
             <a:avLst>
               <a:gd name="adj1" fmla="val 49714"/>
               <a:gd name="adj2" fmla="val 221"/>
-              <a:gd name="adj3" fmla="val 27115"/>
-              <a:gd name="adj4" fmla="val -102783"/>
+              <a:gd name="adj3" fmla="val 33748"/>
+              <a:gd name="adj4" fmla="val -36497"/>
             </a:avLst>
           </a:prstGeom>
         </p:spPr>
@@ -25730,23 +25707,23 @@
             </a:r>
             <a:r>
               <a:rPr lang="en-US" dirty="0" smtClean="0"/>
-              <a:t>to </a:t>
+              <a:t>to have strong teamwork</a:t>
+            </a:r>
+            <a:r>
+              <a:rPr lang="en-US" dirty="0"/>
+              <a:t> </a:t>
             </a:r>
             <a:r>
               <a:rPr lang="en-US" dirty="0" smtClean="0"/>
-              <a:t>have strong teamwork</a:t>
-            </a:r>
-            <a:r>
-              <a:rPr lang="en-US" dirty="0"/>
+              <a:t>and</a:t>
+            </a:r>
+            <a:r>
+              <a:rPr lang="zh-CN" altLang="en-US" dirty="0" smtClean="0"/>
               <a:t> </a:t>
             </a:r>
             <a:r>
               <a:rPr lang="en-US" dirty="0" smtClean="0"/>
-              <a:t>and communication </a:t>
-            </a:r>
-            <a:r>
-              <a:rPr lang="en-US" dirty="0" smtClean="0"/>
-              <a:t>skill</a:t>
+              <a:t>communication skill</a:t>
             </a:r>
             <a:r>
               <a:rPr lang="en-US" altLang="zh-CN" dirty="0" smtClean="0"/>
@@ -25764,15 +25741,15 @@
         </p:nvSpPr>
         <p:spPr>
           <a:xfrm>
-            <a:off x="8828690" y="3152823"/>
+            <a:off x="8781792" y="3191645"/>
             <a:ext cx="3247695" cy="1018331"/>
           </a:xfrm>
           <a:prstGeom prst="borderCallout1">
             <a:avLst>
               <a:gd name="adj1" fmla="val 49714"/>
               <a:gd name="adj2" fmla="val 221"/>
-              <a:gd name="adj3" fmla="val 22470"/>
-              <a:gd name="adj4" fmla="val -153764"/>
+              <a:gd name="adj3" fmla="val 37952"/>
+              <a:gd name="adj4" fmla="val -21240"/>
             </a:avLst>
           </a:prstGeom>
         </p:spPr>
@@ -25862,6 +25839,29 @@
               <a:rPr lang="en-US" b="1" dirty="0" smtClean="0"/>
               <a:t>What is a data-processing pipeline?</a:t>
             </a:r>
+            <a:endParaRPr lang="en-US" dirty="0"/>
+          </a:p>
+        </p:txBody>
+      </p:sp>
+      <p:sp>
+        <p:nvSpPr>
+          <p:cNvPr id="10" name="Slide Number Placeholder 9"/>
+          <p:cNvSpPr>
+            <a:spLocks noGrp="1"/>
+          </p:cNvSpPr>
+          <p:nvPr>
+            <p:ph type="sldNum" sz="quarter" idx="12"/>
+          </p:nvPr>
+        </p:nvSpPr>
+        <p:spPr/>
+        <p:txBody>
+          <a:bodyPr/>
+          <a:lstStyle/>
+          <a:p>
+            <a:fld id="{6113E31D-E2AB-40D1-8B51-AFA5AFEF393A}" type="slidenum">
+              <a:rPr lang="en-US" smtClean="0"/>
+              <a:t>4</a:t>
+            </a:fld>
             <a:endParaRPr lang="en-US" dirty="0"/>
           </a:p>
         </p:txBody>
@@ -26352,10 +26352,10 @@
           <a:bodyPr/>
           <a:lstStyle/>
           <a:p>
-            <a:r>
+            <a:fld id="{2F29736B-56A1-CF42-A7BA-9C91FAF5A325}" type="datetime1">
               <a:rPr lang="en-US" smtClean="0"/>
-              <a:t>02/02/16</a:t>
-            </a:r>
+              <a:t>1/30/17</a:t>
+            </a:fld>
             <a:endParaRPr lang="en-US" dirty="0"/>
           </a:p>
         </p:txBody>
@@ -26379,29 +26379,6 @@
               <a:rPr lang="en-US" smtClean="0"/>
               <a:t>Jiannan Wang - CMPT 733</a:t>
             </a:r>
-            <a:endParaRPr lang="en-US" dirty="0"/>
-          </a:p>
-        </p:txBody>
-      </p:sp>
-      <p:sp>
-        <p:nvSpPr>
-          <p:cNvPr id="6" name="Slide Number Placeholder 5"/>
-          <p:cNvSpPr>
-            <a:spLocks noGrp="1"/>
-          </p:cNvSpPr>
-          <p:nvPr>
-            <p:ph type="sldNum" sz="quarter" idx="12"/>
-          </p:nvPr>
-        </p:nvSpPr>
-        <p:spPr/>
-        <p:txBody>
-          <a:bodyPr/>
-          <a:lstStyle/>
-          <a:p>
-            <a:fld id="{6113E31D-E2AB-40D1-8B51-AFA5AFEF393A}" type="slidenum">
-              <a:rPr lang="en-US" smtClean="0"/>
-              <a:t>5</a:t>
-            </a:fld>
             <a:endParaRPr lang="en-US" dirty="0"/>
           </a:p>
         </p:txBody>
@@ -27127,6 +27104,29 @@
           </a:fontRef>
         </p:style>
       </p:cxnSp>
+      <p:sp>
+        <p:nvSpPr>
+          <p:cNvPr id="3" name="Slide Number Placeholder 2"/>
+          <p:cNvSpPr>
+            <a:spLocks noGrp="1"/>
+          </p:cNvSpPr>
+          <p:nvPr>
+            <p:ph type="sldNum" sz="quarter" idx="12"/>
+          </p:nvPr>
+        </p:nvSpPr>
+        <p:spPr/>
+        <p:txBody>
+          <a:bodyPr/>
+          <a:lstStyle/>
+          <a:p>
+            <a:fld id="{6113E31D-E2AB-40D1-8B51-AFA5AFEF393A}" type="slidenum">
+              <a:rPr lang="en-US" smtClean="0"/>
+              <a:t>5</a:t>
+            </a:fld>
+            <a:endParaRPr lang="en-US" dirty="0"/>
+          </a:p>
+        </p:txBody>
+      </p:sp>
     </p:spTree>
     <p:extLst>
       <p:ext uri="{BB962C8B-B14F-4D97-AF65-F5344CB8AC3E}">
@@ -27766,10 +27766,10 @@
           <a:bodyPr/>
           <a:lstStyle/>
           <a:p>
-            <a:r>
+            <a:fld id="{5B189DE5-81B5-B342-BDB0-61A95E148ABF}" type="datetime1">
               <a:rPr lang="en-US" smtClean="0"/>
-              <a:t>02/02/16</a:t>
-            </a:r>
+              <a:t>1/30/17</a:t>
+            </a:fld>
             <a:endParaRPr lang="en-US" dirty="0"/>
           </a:p>
         </p:txBody>
@@ -27793,29 +27793,6 @@
               <a:rPr lang="en-US" smtClean="0"/>
               <a:t>Jiannan Wang - CMPT 733</a:t>
             </a:r>
-            <a:endParaRPr lang="en-US" dirty="0"/>
-          </a:p>
-        </p:txBody>
-      </p:sp>
-      <p:sp>
-        <p:nvSpPr>
-          <p:cNvPr id="6" name="Slide Number Placeholder 5"/>
-          <p:cNvSpPr>
-            <a:spLocks noGrp="1"/>
-          </p:cNvSpPr>
-          <p:nvPr>
-            <p:ph type="sldNum" sz="quarter" idx="12"/>
-          </p:nvPr>
-        </p:nvSpPr>
-        <p:spPr/>
-        <p:txBody>
-          <a:bodyPr/>
-          <a:lstStyle/>
-          <a:p>
-            <a:fld id="{6113E31D-E2AB-40D1-8B51-AFA5AFEF393A}" type="slidenum">
-              <a:rPr lang="en-US" smtClean="0"/>
-              <a:t>6</a:t>
-            </a:fld>
             <a:endParaRPr lang="en-US" dirty="0"/>
           </a:p>
         </p:txBody>
@@ -28238,14 +28215,6 @@
               </a:rPr>
               <a:t> </a:t>
             </a:r>
-            <a:endParaRPr lang="zh-CN" altLang="en-US" sz="2200" dirty="0" smtClean="0">
-              <a:solidFill>
-                <a:srgbClr val="000000">
-                  <a:lumMod val="75000"/>
-                  <a:lumOff val="25000"/>
-                </a:srgbClr>
-              </a:solidFill>
-            </a:endParaRPr>
           </a:p>
           <a:p>
             <a:r>
@@ -28569,6 +28538,29 @@
           <a:p>
             <a:pPr algn="ctr"/>
             <a:endParaRPr lang="en-US"/>
+          </a:p>
+        </p:txBody>
+      </p:sp>
+      <p:sp>
+        <p:nvSpPr>
+          <p:cNvPr id="7" name="Slide Number Placeholder 6"/>
+          <p:cNvSpPr>
+            <a:spLocks noGrp="1"/>
+          </p:cNvSpPr>
+          <p:nvPr>
+            <p:ph type="sldNum" sz="quarter" idx="12"/>
+          </p:nvPr>
+        </p:nvSpPr>
+        <p:spPr/>
+        <p:txBody>
+          <a:bodyPr/>
+          <a:lstStyle/>
+          <a:p>
+            <a:fld id="{6113E31D-E2AB-40D1-8B51-AFA5AFEF393A}" type="slidenum">
+              <a:rPr lang="en-US" smtClean="0"/>
+              <a:t>6</a:t>
+            </a:fld>
+            <a:endParaRPr lang="en-US" dirty="0"/>
           </a:p>
         </p:txBody>
       </p:sp>
@@ -29305,10 +29297,10 @@
           <a:bodyPr/>
           <a:lstStyle/>
           <a:p>
-            <a:r>
+            <a:fld id="{156C75D0-F000-014C-80D5-6AE824E1B565}" type="datetime1">
               <a:rPr lang="en-US" smtClean="0"/>
-              <a:t>02/02/16</a:t>
-            </a:r>
+              <a:t>1/30/17</a:t>
+            </a:fld>
             <a:endParaRPr lang="en-US" dirty="0"/>
           </a:p>
         </p:txBody>
@@ -29338,7 +29330,7 @@
       </p:sp>
       <p:sp>
         <p:nvSpPr>
-          <p:cNvPr id="6" name="Slide Number Placeholder 5"/>
+          <p:cNvPr id="7" name="Slide Number Placeholder 6"/>
           <p:cNvSpPr>
             <a:spLocks noGrp="1"/>
           </p:cNvSpPr>
@@ -29485,7 +29477,15 @@
             </a:pPr>
             <a:r>
               <a:rPr lang="en-US" sz="3400" dirty="0"/>
-              <a:t>parsing text into fields (separator issues)</a:t>
+              <a:t>P</a:t>
+            </a:r>
+            <a:r>
+              <a:rPr lang="en-US" sz="3400" dirty="0" smtClean="0"/>
+              <a:t>arsing </a:t>
+            </a:r>
+            <a:r>
+              <a:rPr lang="en-US" sz="3400" dirty="0"/>
+              <a:t>text into fields (separator issues)</a:t>
             </a:r>
           </a:p>
           <a:p>
@@ -29648,10 +29648,10 @@
           <a:bodyPr/>
           <a:lstStyle/>
           <a:p>
-            <a:r>
+            <a:fld id="{4930C6D9-9652-DA44-AFB6-14186CE1433F}" type="datetime1">
               <a:rPr lang="en-US" smtClean="0"/>
-              <a:t>02/02/16</a:t>
-            </a:r>
+              <a:t>1/30/17</a:t>
+            </a:fld>
             <a:endParaRPr lang="en-US" dirty="0"/>
           </a:p>
         </p:txBody>
@@ -29681,7 +29681,7 @@
       </p:sp>
       <p:sp>
         <p:nvSpPr>
-          <p:cNvPr id="6" name="Slide Number Placeholder 5"/>
+          <p:cNvPr id="7" name="Slide Number Placeholder 6"/>
           <p:cNvSpPr>
             <a:spLocks noGrp="1"/>
           </p:cNvSpPr>
@@ -30336,10 +30336,10 @@
           <a:bodyPr/>
           <a:lstStyle/>
           <a:p>
-            <a:r>
+            <a:fld id="{C7372578-5B6B-3C40-9ECA-3D89AED8F592}" type="datetime1">
               <a:rPr lang="en-US" smtClean="0"/>
-              <a:t>02/02/16</a:t>
-            </a:r>
+              <a:t>1/30/17</a:t>
+            </a:fld>
             <a:endParaRPr lang="en-US" dirty="0"/>
           </a:p>
         </p:txBody>
@@ -30369,7 +30369,7 @@
       </p:sp>
       <p:sp>
         <p:nvSpPr>
-          <p:cNvPr id="6" name="Slide Number Placeholder 5"/>
+          <p:cNvPr id="7" name="Slide Number Placeholder 6"/>
           <p:cNvSpPr>
             <a:spLocks noGrp="1"/>
           </p:cNvSpPr>

</xml_diff>